<commit_message>
Updated for new display-read wescheme lib
</commit_message>
<xml_diff>
--- a/tehtavat/tiedostot/maol/power_point/Racket-maol-teachpacks.pptx
+++ b/tehtavat/tiedostot/maol/power_point/Racket-maol-teachpacks.pptx
@@ -16,21 +16,21 @@
   <p:notesSz cx="6858000" cy="9144000"/>
   <p:embeddedFontLst>
     <p:embeddedFont>
-      <p:font typeface="Arimo" panose="020B0604020202020204" charset="0"/>
+      <p:font typeface="Calibri" panose="020F0502020204030204" pitchFamily="34" charset="0"/>
       <p:regular r:id="rId6"/>
       <p:bold r:id="rId7"/>
       <p:italic r:id="rId8"/>
       <p:boldItalic r:id="rId9"/>
     </p:embeddedFont>
     <p:embeddedFont>
-      <p:font typeface="Calibri" panose="020F0502020204030204" pitchFamily="34" charset="0"/>
+      <p:font typeface="Cabin"/>
       <p:regular r:id="rId10"/>
       <p:bold r:id="rId11"/>
       <p:italic r:id="rId12"/>
       <p:boldItalic r:id="rId13"/>
     </p:embeddedFont>
     <p:embeddedFont>
-      <p:font typeface="Cabin"/>
+      <p:font typeface="Arimo" panose="020B0604020202020204" charset="0"/>
       <p:regular r:id="rId14"/>
       <p:bold r:id="rId15"/>
       <p:italic r:id="rId16"/>
@@ -239,6 +239,11 @@
       </a:defRPr>
     </a:lvl9pPr>
   </p:defaultTextStyle>
+  <p:extLst>
+    <p:ext uri="{EFAFB233-063F-42B5-8137-9DF3F51BA10A}">
+      <p15:sldGuideLst xmlns:p15="http://schemas.microsoft.com/office/powerpoint/2012/main"/>
+    </p:ext>
+  </p:extLst>
 </p:presentation>
 </file>
 
@@ -23782,7 +23787,7 @@
                 <a:cs typeface="Arial"/>
                 <a:sym typeface="Arial"/>
               </a:rPr>
-              <a:t>	</a:t>
+              <a:t>	  </a:t>
             </a:r>
             <a:r>
               <a:rPr lang="fi-FI" sz="2400" dirty="0">
@@ -23807,7 +23812,39 @@
                   <a:srgbClr val="124163"/>
                 </a:solidFill>
               </a:rPr>
-              <a:t>(require wescheme/1Q1f9pSrg8)	</a:t>
+              <a:t>(</a:t>
+            </a:r>
+            <a:r>
+              <a:rPr lang="fi-FI" sz="2400" dirty="0" err="1">
+                <a:solidFill>
+                  <a:srgbClr val="124163"/>
+                </a:solidFill>
+              </a:rPr>
+              <a:t>require</a:t>
+            </a:r>
+            <a:r>
+              <a:rPr lang="fi-FI" sz="2400" dirty="0">
+                <a:solidFill>
+                  <a:srgbClr val="124163"/>
+                </a:solidFill>
+              </a:rPr>
+              <a:t> </a:t>
+            </a:r>
+            <a:r>
+              <a:rPr lang="fi-FI" sz="2400" dirty="0" err="1">
+                <a:solidFill>
+                  <a:srgbClr val="124163"/>
+                </a:solidFill>
+              </a:rPr>
+              <a:t>wescheme</a:t>
+            </a:r>
+            <a:r>
+              <a:rPr lang="fi-FI" sz="2400" dirty="0">
+                <a:solidFill>
+                  <a:srgbClr val="124163"/>
+                </a:solidFill>
+              </a:rPr>
+              <a:t>/RWJy5EoNzk) </a:t>
             </a:r>
             <a:r>
               <a:rPr lang="fi-FI" sz="2400" dirty="0">
@@ -23828,7 +23865,7 @@
                   <a:srgbClr val="124163"/>
                 </a:solidFill>
               </a:rPr>
-              <a:t>(require wescheme/f08DD6x94M)	</a:t>
+              <a:t>(require wescheme/f08DD6x94M)	  </a:t>
             </a:r>
             <a:r>
               <a:rPr lang="fi-FI" sz="2400" dirty="0">
@@ -23849,7 +23886,7 @@
                   <a:srgbClr val="124163"/>
                 </a:solidFill>
               </a:rPr>
-              <a:t>(require wescheme/2W8inC9p82)	</a:t>
+              <a:t>(require wescheme/2W8inC9p82)	  </a:t>
             </a:r>
             <a:r>
               <a:rPr lang="fi-FI" sz="2400" dirty="0">

</xml_diff>